<commit_message>
work over some mistakes
</commit_message>
<xml_diff>
--- a/ppt/chapter 10.pptx
+++ b/ppt/chapter 10.pptx
@@ -17963,127 +17963,13 @@
               <a:buNone/>
             </a:pPr>
             <a:r>
-              <a:rPr lang="en-US" altLang="zh-CN" sz="1600" dirty="0">
-                <a:solidFill>
-                  <a:srgbClr val="0000FF"/>
-                </a:solidFill>
-                <a:ea typeface="宋体" panose="02010600030101010101" pitchFamily="2" charset="-122"/>
-              </a:rPr>
-              <a:t>public:</a:t>
-            </a:r>
-          </a:p>
-          <a:p>
-            <a:pPr marL="0" indent="0">
-              <a:buNone/>
-            </a:pPr>
-            <a:r>
               <a:rPr lang="en-US" altLang="zh-CN" sz="1600" dirty="0" smtClean="0">
                 <a:solidFill>
                   <a:srgbClr val="0000FF"/>
                 </a:solidFill>
                 <a:ea typeface="宋体" panose="02010600030101010101" pitchFamily="2" charset="-122"/>
               </a:rPr>
-              <a:t>	</a:t>
-            </a:r>
-            <a:r>
-              <a:rPr lang="en-US" altLang="zh-CN" sz="1600" dirty="0" err="1" smtClean="0">
-                <a:solidFill>
-                  <a:srgbClr val="0000FF"/>
-                </a:solidFill>
-                <a:ea typeface="宋体" panose="02010600030101010101" pitchFamily="2" charset="-122"/>
-              </a:rPr>
-              <a:t>int</a:t>
-            </a:r>
-            <a:r>
-              <a:rPr lang="en-US" altLang="zh-CN" sz="1600" dirty="0" smtClean="0">
-                <a:solidFill>
-                  <a:srgbClr val="0000FF"/>
-                </a:solidFill>
-                <a:ea typeface="宋体" panose="02010600030101010101" pitchFamily="2" charset="-122"/>
-              </a:rPr>
-              <a:t> </a:t>
-            </a:r>
-            <a:r>
-              <a:rPr lang="en-US" altLang="zh-CN" sz="1600" dirty="0">
-                <a:solidFill>
-                  <a:srgbClr val="0000FF"/>
-                </a:solidFill>
-                <a:ea typeface="宋体" panose="02010600030101010101" pitchFamily="2" charset="-122"/>
-              </a:rPr>
-              <a:t>x;</a:t>
-            </a:r>
-          </a:p>
-          <a:p>
-            <a:pPr marL="0" indent="0">
-              <a:buNone/>
-            </a:pPr>
-            <a:r>
-              <a:rPr lang="en-US" altLang="zh-CN" sz="1600" dirty="0">
-                <a:solidFill>
-                  <a:srgbClr val="0000FF"/>
-                </a:solidFill>
-                <a:ea typeface="宋体" panose="02010600030101010101" pitchFamily="2" charset="-122"/>
-              </a:rPr>
               <a:t>private:</a:t>
-            </a:r>
-          </a:p>
-          <a:p>
-            <a:pPr marL="0" indent="0">
-              <a:buNone/>
-            </a:pPr>
-            <a:r>
-              <a:rPr lang="en-US" altLang="zh-CN" sz="1600" dirty="0">
-                <a:solidFill>
-                  <a:srgbClr val="0000FF"/>
-                </a:solidFill>
-                <a:ea typeface="宋体" panose="02010600030101010101" pitchFamily="2" charset="-122"/>
-              </a:rPr>
-              <a:t>	void </a:t>
-            </a:r>
-            <a:r>
-              <a:rPr lang="en-US" altLang="zh-CN" sz="1600" dirty="0" err="1">
-                <a:solidFill>
-                  <a:srgbClr val="0000FF"/>
-                </a:solidFill>
-                <a:ea typeface="宋体" panose="02010600030101010101" pitchFamily="2" charset="-122"/>
-              </a:rPr>
-              <a:t>setX</a:t>
-            </a:r>
-            <a:r>
-              <a:rPr lang="en-US" altLang="zh-CN" sz="1600" dirty="0">
-                <a:solidFill>
-                  <a:srgbClr val="0000FF"/>
-                </a:solidFill>
-                <a:ea typeface="宋体" panose="02010600030101010101" pitchFamily="2" charset="-122"/>
-              </a:rPr>
-              <a:t>(</a:t>
-            </a:r>
-            <a:r>
-              <a:rPr lang="en-US" altLang="zh-CN" sz="1600" dirty="0" err="1">
-                <a:solidFill>
-                  <a:srgbClr val="0000FF"/>
-                </a:solidFill>
-                <a:ea typeface="宋体" panose="02010600030101010101" pitchFamily="2" charset="-122"/>
-              </a:rPr>
-              <a:t>int</a:t>
-            </a:r>
-            <a:r>
-              <a:rPr lang="en-US" altLang="zh-CN" sz="1600" dirty="0">
-                <a:solidFill>
-                  <a:srgbClr val="0000FF"/>
-                </a:solidFill>
-                <a:ea typeface="宋体" panose="02010600030101010101" pitchFamily="2" charset="-122"/>
-              </a:rPr>
-              <a:t> </a:t>
-            </a:r>
-            <a:r>
-              <a:rPr lang="en-US" altLang="zh-CN" sz="1600" dirty="0" smtClean="0">
-                <a:solidFill>
-                  <a:srgbClr val="0000FF"/>
-                </a:solidFill>
-                <a:ea typeface="宋体" panose="02010600030101010101" pitchFamily="2" charset="-122"/>
-              </a:rPr>
-              <a:t>a); </a:t>
             </a:r>
             <a:endParaRPr lang="en-US" altLang="zh-CN" sz="1600" dirty="0">
               <a:solidFill>
@@ -18097,49 +17983,40 @@
               <a:buNone/>
             </a:pPr>
             <a:r>
+              <a:rPr lang="en-US" altLang="zh-CN" sz="1600" dirty="0" smtClean="0">
+                <a:solidFill>
+                  <a:srgbClr val="0000FF"/>
+                </a:solidFill>
+                <a:ea typeface="宋体" panose="02010600030101010101" pitchFamily="2" charset="-122"/>
+              </a:rPr>
+              <a:t>	</a:t>
+            </a:r>
+            <a:r>
+              <a:rPr lang="en-US" altLang="zh-CN" sz="1600" dirty="0" err="1" smtClean="0">
+                <a:solidFill>
+                  <a:srgbClr val="0000FF"/>
+                </a:solidFill>
+                <a:ea typeface="宋体" panose="02010600030101010101" pitchFamily="2" charset="-122"/>
+              </a:rPr>
+              <a:t>int</a:t>
+            </a:r>
+            <a:r>
+              <a:rPr lang="en-US" altLang="zh-CN" sz="1600" dirty="0" smtClean="0">
+                <a:solidFill>
+                  <a:srgbClr val="0000FF"/>
+                </a:solidFill>
+                <a:ea typeface="宋体" panose="02010600030101010101" pitchFamily="2" charset="-122"/>
+              </a:rPr>
+              <a:t> </a:t>
+            </a:r>
+            <a:r>
               <a:rPr lang="en-US" altLang="zh-CN" sz="1600" dirty="0">
                 <a:solidFill>
                   <a:srgbClr val="0000FF"/>
                 </a:solidFill>
                 <a:ea typeface="宋体" panose="02010600030101010101" pitchFamily="2" charset="-122"/>
               </a:rPr>
-              <a:t>	</a:t>
-            </a:r>
-            <a:r>
-              <a:rPr lang="en-US" altLang="zh-CN" sz="1600" dirty="0" err="1">
-                <a:solidFill>
-                  <a:srgbClr val="0000FF"/>
-                </a:solidFill>
-                <a:ea typeface="宋体" panose="02010600030101010101" pitchFamily="2" charset="-122"/>
-              </a:rPr>
-              <a:t>int</a:t>
-            </a:r>
-            <a:r>
-              <a:rPr lang="en-US" altLang="zh-CN" sz="1600" dirty="0">
-                <a:solidFill>
-                  <a:srgbClr val="0000FF"/>
-                </a:solidFill>
-                <a:ea typeface="宋体" panose="02010600030101010101" pitchFamily="2" charset="-122"/>
-              </a:rPr>
-              <a:t> </a:t>
-            </a:r>
-            <a:r>
-              <a:rPr lang="en-US" altLang="zh-CN" sz="1600" dirty="0" err="1">
-                <a:solidFill>
-                  <a:srgbClr val="0000FF"/>
-                </a:solidFill>
-                <a:ea typeface="宋体" panose="02010600030101010101" pitchFamily="2" charset="-122"/>
-              </a:rPr>
-              <a:t>getX</a:t>
-            </a:r>
-            <a:r>
-              <a:rPr lang="en-US" altLang="zh-CN" sz="1600" dirty="0">
-                <a:solidFill>
-                  <a:srgbClr val="0000FF"/>
-                </a:solidFill>
-                <a:ea typeface="宋体" panose="02010600030101010101" pitchFamily="2" charset="-122"/>
-              </a:rPr>
-              <a:t>(){</a:t>
+              <a:t>x;</a:t>
             </a:r>
           </a:p>
           <a:p>
@@ -18147,14 +18024,20 @@
               <a:buNone/>
             </a:pPr>
             <a:r>
-              <a:rPr lang="en-US" altLang="zh-CN" sz="1600" dirty="0">
-                <a:solidFill>
-                  <a:srgbClr val="0000FF"/>
-                </a:solidFill>
-                <a:ea typeface="宋体" panose="02010600030101010101" pitchFamily="2" charset="-122"/>
-              </a:rPr>
-              <a:t>		return x;</a:t>
-            </a:r>
+              <a:rPr lang="en-US" altLang="zh-CN" sz="1600" dirty="0" smtClean="0">
+                <a:solidFill>
+                  <a:srgbClr val="0000FF"/>
+                </a:solidFill>
+                <a:ea typeface="宋体" panose="02010600030101010101" pitchFamily="2" charset="-122"/>
+              </a:rPr>
+              <a:t>public:</a:t>
+            </a:r>
+            <a:endParaRPr lang="en-US" altLang="zh-CN" sz="1600" dirty="0">
+              <a:solidFill>
+                <a:srgbClr val="0000FF"/>
+              </a:solidFill>
+              <a:ea typeface="宋体" panose="02010600030101010101" pitchFamily="2" charset="-122"/>
+            </a:endParaRPr>
           </a:p>
           <a:p>
             <a:pPr marL="0" indent="0">
@@ -18167,21 +18050,108 @@
                 </a:solidFill>
                 <a:ea typeface="宋体" panose="02010600030101010101" pitchFamily="2" charset="-122"/>
               </a:rPr>
-              <a:t>	}</a:t>
-            </a:r>
+              <a:t>	void </a:t>
+            </a:r>
+            <a:r>
+              <a:rPr lang="en-US" altLang="zh-CN" sz="1600" dirty="0" err="1">
+                <a:solidFill>
+                  <a:srgbClr val="0000FF"/>
+                </a:solidFill>
+                <a:ea typeface="宋体" panose="02010600030101010101" pitchFamily="2" charset="-122"/>
+              </a:rPr>
+              <a:t>setX</a:t>
+            </a:r>
+            <a:r>
+              <a:rPr lang="en-US" altLang="zh-CN" sz="1600" dirty="0">
+                <a:solidFill>
+                  <a:srgbClr val="0000FF"/>
+                </a:solidFill>
+                <a:ea typeface="宋体" panose="02010600030101010101" pitchFamily="2" charset="-122"/>
+              </a:rPr>
+              <a:t>(</a:t>
+            </a:r>
+            <a:r>
+              <a:rPr lang="en-US" altLang="zh-CN" sz="1600" dirty="0" err="1">
+                <a:solidFill>
+                  <a:srgbClr val="0000FF"/>
+                </a:solidFill>
+                <a:ea typeface="宋体" panose="02010600030101010101" pitchFamily="2" charset="-122"/>
+              </a:rPr>
+              <a:t>int</a:t>
+            </a:r>
+            <a:r>
+              <a:rPr lang="en-US" altLang="zh-CN" sz="1600" dirty="0">
+                <a:solidFill>
+                  <a:srgbClr val="0000FF"/>
+                </a:solidFill>
+                <a:ea typeface="宋体" panose="02010600030101010101" pitchFamily="2" charset="-122"/>
+              </a:rPr>
+              <a:t> </a:t>
+            </a:r>
+            <a:r>
+              <a:rPr lang="en-US" altLang="zh-CN" sz="1600" dirty="0" smtClean="0">
+                <a:solidFill>
+                  <a:srgbClr val="0000FF"/>
+                </a:solidFill>
+                <a:ea typeface="宋体" panose="02010600030101010101" pitchFamily="2" charset="-122"/>
+              </a:rPr>
+              <a:t>a); </a:t>
+            </a:r>
+            <a:endParaRPr lang="en-US" altLang="zh-CN" sz="1600" dirty="0">
+              <a:solidFill>
+                <a:srgbClr val="0000FF"/>
+              </a:solidFill>
+              <a:ea typeface="宋体" panose="02010600030101010101" pitchFamily="2" charset="-122"/>
+            </a:endParaRPr>
           </a:p>
           <a:p>
             <a:pPr marL="0" indent="0">
               <a:buNone/>
             </a:pPr>
             <a:r>
-              <a:rPr lang="en-US" altLang="zh-CN" sz="1600" dirty="0" smtClean="0">
-                <a:solidFill>
-                  <a:srgbClr val="0000FF"/>
-                </a:solidFill>
-                <a:ea typeface="宋体" panose="02010600030101010101" pitchFamily="2" charset="-122"/>
-              </a:rPr>
-              <a:t>};</a:t>
+              <a:rPr lang="en-US" altLang="zh-CN" sz="1600" dirty="0">
+                <a:solidFill>
+                  <a:srgbClr val="0000FF"/>
+                </a:solidFill>
+                <a:ea typeface="宋体" panose="02010600030101010101" pitchFamily="2" charset="-122"/>
+              </a:rPr>
+              <a:t>	</a:t>
+            </a:r>
+            <a:r>
+              <a:rPr lang="en-US" altLang="zh-CN" sz="1600" dirty="0" err="1">
+                <a:solidFill>
+                  <a:srgbClr val="0000FF"/>
+                </a:solidFill>
+                <a:ea typeface="宋体" panose="02010600030101010101" pitchFamily="2" charset="-122"/>
+              </a:rPr>
+              <a:t>int</a:t>
+            </a:r>
+            <a:r>
+              <a:rPr lang="en-US" altLang="zh-CN" sz="1600" dirty="0">
+                <a:solidFill>
+                  <a:srgbClr val="0000FF"/>
+                </a:solidFill>
+                <a:ea typeface="宋体" panose="02010600030101010101" pitchFamily="2" charset="-122"/>
+              </a:rPr>
+              <a:t> </a:t>
+            </a:r>
+            <a:r>
+              <a:rPr lang="en-US" altLang="zh-CN" sz="1600" dirty="0" err="1">
+                <a:solidFill>
+                  <a:srgbClr val="0000FF"/>
+                </a:solidFill>
+                <a:ea typeface="宋体" panose="02010600030101010101" pitchFamily="2" charset="-122"/>
+              </a:rPr>
+              <a:t>getX</a:t>
+            </a:r>
+            <a:r>
+              <a:rPr lang="en-US" altLang="zh-CN" sz="1600" dirty="0">
+                <a:solidFill>
+                  <a:srgbClr val="0000FF"/>
+                </a:solidFill>
+                <a:ea typeface="宋体" panose="02010600030101010101" pitchFamily="2" charset="-122"/>
+              </a:rPr>
+              <a:t>(){</a:t>
             </a:r>
           </a:p>
           <a:p>
@@ -18195,52 +18165,7 @@
                 </a:solidFill>
                 <a:ea typeface="宋体" panose="02010600030101010101" pitchFamily="2" charset="-122"/>
               </a:rPr>
-              <a:t>v</a:t>
-            </a:r>
-            <a:r>
-              <a:rPr lang="en-US" altLang="zh-CN" sz="1600" dirty="0" smtClean="0">
-                <a:solidFill>
-                  <a:srgbClr val="0000FF"/>
-                </a:solidFill>
-                <a:ea typeface="宋体" panose="02010600030101010101" pitchFamily="2" charset="-122"/>
-              </a:rPr>
-              <a:t>oid </a:t>
-            </a:r>
-            <a:r>
-              <a:rPr lang="en-US" altLang="zh-CN" sz="1600" dirty="0" err="1" smtClean="0">
-                <a:solidFill>
-                  <a:srgbClr val="0000FF"/>
-                </a:solidFill>
-                <a:ea typeface="宋体" panose="02010600030101010101" pitchFamily="2" charset="-122"/>
-              </a:rPr>
-              <a:t>class_name</a:t>
-            </a:r>
-            <a:r>
-              <a:rPr lang="en-US" altLang="zh-CN" sz="1600" dirty="0" smtClean="0">
-                <a:solidFill>
-                  <a:srgbClr val="0000FF"/>
-                </a:solidFill>
-                <a:ea typeface="宋体" panose="02010600030101010101" pitchFamily="2" charset="-122"/>
-              </a:rPr>
-              <a:t>::( </a:t>
-            </a:r>
-            <a:r>
-              <a:rPr lang="en-US" altLang="zh-CN" sz="1600" dirty="0" err="1" smtClean="0">
-                <a:solidFill>
-                  <a:srgbClr val="0000FF"/>
-                </a:solidFill>
-                <a:ea typeface="宋体" panose="02010600030101010101" pitchFamily="2" charset="-122"/>
-              </a:rPr>
-              <a:t>int</a:t>
-            </a:r>
-            <a:r>
-              <a:rPr lang="en-US" altLang="zh-CN" sz="1600" dirty="0" smtClean="0">
-                <a:solidFill>
-                  <a:srgbClr val="0000FF"/>
-                </a:solidFill>
-                <a:ea typeface="宋体" panose="02010600030101010101" pitchFamily="2" charset="-122"/>
-              </a:rPr>
-              <a:t> a){</a:t>
+              <a:t>		return x;</a:t>
             </a:r>
           </a:p>
           <a:p>
@@ -18248,13 +18173,13 @@
               <a:buNone/>
             </a:pPr>
             <a:r>
-              <a:rPr lang="en-US" altLang="zh-CN" sz="1600" dirty="0" smtClean="0">
-                <a:solidFill>
-                  <a:srgbClr val="0000FF"/>
-                </a:solidFill>
-                <a:ea typeface="宋体" panose="02010600030101010101" pitchFamily="2" charset="-122"/>
-              </a:rPr>
-              <a:t>	X=a;</a:t>
+              <a:rPr lang="en-US" altLang="zh-CN" sz="1600" dirty="0">
+                <a:solidFill>
+                  <a:srgbClr val="0000FF"/>
+                </a:solidFill>
+                <a:ea typeface="宋体" panose="02010600030101010101" pitchFamily="2" charset="-122"/>
+              </a:rPr>
+              <a:t>	}</a:t>
             </a:r>
           </a:p>
           <a:p>
@@ -18268,7 +18193,7 @@
                 </a:solidFill>
                 <a:ea typeface="宋体" panose="02010600030101010101" pitchFamily="2" charset="-122"/>
               </a:rPr>
-              <a:t>}</a:t>
+              <a:t>};</a:t>
             </a:r>
           </a:p>
           <a:p>
@@ -18276,13 +18201,31 @@
               <a:buNone/>
             </a:pPr>
             <a:r>
+              <a:rPr lang="en-US" altLang="zh-CN" sz="1600" dirty="0">
+                <a:solidFill>
+                  <a:srgbClr val="0000FF"/>
+                </a:solidFill>
+                <a:ea typeface="宋体" panose="02010600030101010101" pitchFamily="2" charset="-122"/>
+              </a:rPr>
+              <a:t>v</a:t>
+            </a:r>
+            <a:r>
+              <a:rPr lang="en-US" altLang="zh-CN" sz="1600" dirty="0" smtClean="0">
+                <a:solidFill>
+                  <a:srgbClr val="0000FF"/>
+                </a:solidFill>
+                <a:ea typeface="宋体" panose="02010600030101010101" pitchFamily="2" charset="-122"/>
+              </a:rPr>
+              <a:t>oid </a:t>
+            </a:r>
+            <a:r>
               <a:rPr lang="en-US" altLang="zh-CN" sz="1600" dirty="0" err="1" smtClean="0">
                 <a:solidFill>
                   <a:srgbClr val="0000FF"/>
                 </a:solidFill>
                 <a:ea typeface="宋体" panose="02010600030101010101" pitchFamily="2" charset="-122"/>
               </a:rPr>
-              <a:t>Int</a:t>
+              <a:t>class_name</a:t>
             </a:r>
             <a:r>
               <a:rPr lang="en-US" altLang="zh-CN" sz="1600" dirty="0" smtClean="0">
@@ -18291,7 +18234,43 @@
                 </a:solidFill>
                 <a:ea typeface="宋体" panose="02010600030101010101" pitchFamily="2" charset="-122"/>
               </a:rPr>
-              <a:t> main(){</a:t>
+              <a:t>::</a:t>
+            </a:r>
+            <a:r>
+              <a:rPr lang="en-US" altLang="zh-CN" sz="1600" dirty="0" err="1" smtClean="0">
+                <a:solidFill>
+                  <a:srgbClr val="0000FF"/>
+                </a:solidFill>
+                <a:ea typeface="宋体" panose="02010600030101010101" pitchFamily="2" charset="-122"/>
+              </a:rPr>
+              <a:t>setX</a:t>
+            </a:r>
+            <a:r>
+              <a:rPr lang="en-US" altLang="zh-CN" sz="1600" dirty="0" smtClean="0">
+                <a:solidFill>
+                  <a:srgbClr val="0000FF"/>
+                </a:solidFill>
+                <a:ea typeface="宋体" panose="02010600030101010101" pitchFamily="2" charset="-122"/>
+              </a:rPr>
+              <a:t>( </a:t>
+            </a:r>
+            <a:r>
+              <a:rPr lang="en-US" altLang="zh-CN" sz="1600" dirty="0" err="1" smtClean="0">
+                <a:solidFill>
+                  <a:srgbClr val="0000FF"/>
+                </a:solidFill>
+                <a:ea typeface="宋体" panose="02010600030101010101" pitchFamily="2" charset="-122"/>
+              </a:rPr>
+              <a:t>int</a:t>
+            </a:r>
+            <a:r>
+              <a:rPr lang="en-US" altLang="zh-CN" sz="1600" dirty="0" smtClean="0">
+                <a:solidFill>
+                  <a:srgbClr val="0000FF"/>
+                </a:solidFill>
+                <a:ea typeface="宋体" panose="02010600030101010101" pitchFamily="2" charset="-122"/>
+              </a:rPr>
+              <a:t> a){</a:t>
             </a:r>
           </a:p>
           <a:p>
@@ -18305,16 +18284,7 @@
                 </a:solidFill>
                 <a:ea typeface="宋体" panose="02010600030101010101" pitchFamily="2" charset="-122"/>
               </a:rPr>
-              <a:t>   </a:t>
-            </a:r>
-            <a:r>
-              <a:rPr lang="en-US" altLang="zh-CN" sz="1600" dirty="0" err="1" smtClean="0">
-                <a:solidFill>
-                  <a:srgbClr val="0000FF"/>
-                </a:solidFill>
-                <a:ea typeface="宋体" panose="02010600030101010101" pitchFamily="2" charset="-122"/>
-              </a:rPr>
-              <a:t>class_name</a:t>
+              <a:t>	</a:t>
             </a:r>
             <a:r>
               <a:rPr lang="en-US" altLang="zh-CN" sz="1600" dirty="0" smtClean="0">
@@ -18323,7 +18293,16 @@
                 </a:solidFill>
                 <a:ea typeface="宋体" panose="02010600030101010101" pitchFamily="2" charset="-122"/>
               </a:rPr>
-              <a:t> A;</a:t>
+              <a:t>x=a</a:t>
+            </a:r>
+            <a:r>
+              <a:rPr lang="en-US" altLang="zh-CN" sz="1600" dirty="0" smtClean="0">
+                <a:solidFill>
+                  <a:srgbClr val="0000FF"/>
+                </a:solidFill>
+                <a:ea typeface="宋体" panose="02010600030101010101" pitchFamily="2" charset="-122"/>
+              </a:rPr>
+              <a:t>;</a:t>
             </a:r>
           </a:p>
           <a:p>
@@ -18331,6 +18310,90 @@
               <a:buNone/>
             </a:pPr>
             <a:r>
+              <a:rPr lang="en-US" altLang="zh-CN" sz="1600" dirty="0" smtClean="0">
+                <a:solidFill>
+                  <a:srgbClr val="0000FF"/>
+                </a:solidFill>
+                <a:ea typeface="宋体" panose="02010600030101010101" pitchFamily="2" charset="-122"/>
+              </a:rPr>
+              <a:t>}</a:t>
+            </a:r>
+          </a:p>
+          <a:p>
+            <a:pPr marL="0" indent="0">
+              <a:buNone/>
+            </a:pPr>
+            <a:r>
+              <a:rPr lang="en-US" altLang="zh-CN" sz="1600" dirty="0" err="1" smtClean="0">
+                <a:solidFill>
+                  <a:srgbClr val="0000FF"/>
+                </a:solidFill>
+                <a:ea typeface="宋体" panose="02010600030101010101" pitchFamily="2" charset="-122"/>
+              </a:rPr>
+              <a:t>Int</a:t>
+            </a:r>
+            <a:r>
+              <a:rPr lang="en-US" altLang="zh-CN" sz="1600" dirty="0" smtClean="0">
+                <a:solidFill>
+                  <a:srgbClr val="0000FF"/>
+                </a:solidFill>
+                <a:ea typeface="宋体" panose="02010600030101010101" pitchFamily="2" charset="-122"/>
+              </a:rPr>
+              <a:t> main(){</a:t>
+            </a:r>
+          </a:p>
+          <a:p>
+            <a:pPr marL="0" indent="0">
+              <a:buNone/>
+            </a:pPr>
+            <a:r>
+              <a:rPr lang="en-US" altLang="zh-CN" sz="1600" dirty="0" smtClean="0">
+                <a:solidFill>
+                  <a:srgbClr val="0000FF"/>
+                </a:solidFill>
+                <a:ea typeface="宋体" panose="02010600030101010101" pitchFamily="2" charset="-122"/>
+              </a:rPr>
+              <a:t>   </a:t>
+            </a:r>
+            <a:r>
+              <a:rPr lang="en-US" altLang="zh-CN" sz="1600" dirty="0" err="1" smtClean="0">
+                <a:solidFill>
+                  <a:srgbClr val="0000FF"/>
+                </a:solidFill>
+                <a:ea typeface="宋体" panose="02010600030101010101" pitchFamily="2" charset="-122"/>
+              </a:rPr>
+              <a:t>class_name</a:t>
+            </a:r>
+            <a:r>
+              <a:rPr lang="en-US" altLang="zh-CN" sz="1600" dirty="0" smtClean="0">
+                <a:solidFill>
+                  <a:srgbClr val="0000FF"/>
+                </a:solidFill>
+                <a:ea typeface="宋体" panose="02010600030101010101" pitchFamily="2" charset="-122"/>
+              </a:rPr>
+              <a:t> </a:t>
+            </a:r>
+            <a:r>
+              <a:rPr lang="en-US" altLang="zh-CN" sz="1600" dirty="0" smtClean="0">
+                <a:solidFill>
+                  <a:srgbClr val="0000FF"/>
+                </a:solidFill>
+                <a:ea typeface="宋体" panose="02010600030101010101" pitchFamily="2" charset="-122"/>
+              </a:rPr>
+              <a:t> temp;</a:t>
+            </a:r>
+            <a:endParaRPr lang="en-US" altLang="zh-CN" sz="1600" dirty="0" smtClean="0">
+              <a:solidFill>
+                <a:srgbClr val="0000FF"/>
+              </a:solidFill>
+              <a:ea typeface="宋体" panose="02010600030101010101" pitchFamily="2" charset="-122"/>
+            </a:endParaRPr>
+          </a:p>
+          <a:p>
+            <a:pPr marL="0" indent="0">
+              <a:buNone/>
+            </a:pPr>
+            <a:r>
               <a:rPr lang="en-US" altLang="zh-CN" sz="1600" dirty="0">
                 <a:solidFill>
                   <a:srgbClr val="0000FF"/>
@@ -18355,7 +18418,16 @@
                 </a:solidFill>
                 <a:ea typeface="宋体" panose="02010600030101010101" pitchFamily="2" charset="-122"/>
               </a:rPr>
-              <a:t>A.setX</a:t>
+              <a:t>temp</a:t>
+            </a:r>
+            <a:r>
+              <a:rPr lang="en-US" altLang="zh-CN" sz="1600" dirty="0" err="1" smtClean="0">
+                <a:solidFill>
+                  <a:srgbClr val="0000FF"/>
+                </a:solidFill>
+                <a:ea typeface="宋体" panose="02010600030101010101" pitchFamily="2" charset="-122"/>
+              </a:rPr>
+              <a:t>.setX</a:t>
             </a:r>
             <a:r>
               <a:rPr lang="en-US" altLang="zh-CN" sz="1600" dirty="0" smtClean="0">
@@ -18364,7 +18436,16 @@
                 </a:solidFill>
                 <a:ea typeface="宋体" panose="02010600030101010101" pitchFamily="2" charset="-122"/>
               </a:rPr>
-              <a:t>(2);</a:t>
+              <a:t>(2</a:t>
+            </a:r>
+            <a:r>
+              <a:rPr lang="en-US" altLang="zh-CN" sz="1600" dirty="0" smtClean="0">
+                <a:solidFill>
+                  <a:srgbClr val="0000FF"/>
+                </a:solidFill>
+                <a:ea typeface="宋体" panose="02010600030101010101" pitchFamily="2" charset="-122"/>
+              </a:rPr>
+              <a:t>);</a:t>
             </a:r>
           </a:p>
           <a:p>

</xml_diff>